<commit_message>
Changed the order of some slides and updated the README.md with prerequisites
</commit_message>
<xml_diff>
--- a/Presentation/Azure Containers.pptx
+++ b/Presentation/Azure Containers.pptx
@@ -19,9 +19,9 @@
     <p:sldId id="269" r:id="rId10"/>
     <p:sldId id="276" r:id="rId11"/>
     <p:sldId id="279" r:id="rId12"/>
-    <p:sldId id="277" r:id="rId13"/>
-    <p:sldId id="293" r:id="rId14"/>
-    <p:sldId id="297" r:id="rId15"/>
+    <p:sldId id="293" r:id="rId13"/>
+    <p:sldId id="297" r:id="rId14"/>
+    <p:sldId id="277" r:id="rId15"/>
     <p:sldId id="281" r:id="rId16"/>
     <p:sldId id="278" r:id="rId17"/>
     <p:sldId id="280" r:id="rId18"/>
@@ -225,7 +225,7 @@
           <a:p>
             <a:fld id="{0979208A-55E4-469B-B1DA-8B76194F5175}" type="datetimeFigureOut">
               <a:rPr lang="en-GB" smtClean="0"/>
-              <a:t>18/03/2019</a:t>
+              <a:t>21/03/2019</a:t>
             </a:fld>
             <a:endParaRPr lang="en-GB"/>
           </a:p>
@@ -776,7 +776,7 @@
           <a:p>
             <a:fld id="{46E06AA9-D0AD-45A1-A7DA-EE120CAAFDBD}" type="datetimeFigureOut">
               <a:rPr lang="en-GB" smtClean="0"/>
-              <a:t>18/03/2019</a:t>
+              <a:t>21/03/2019</a:t>
             </a:fld>
             <a:endParaRPr lang="en-GB"/>
           </a:p>
@@ -976,7 +976,7 @@
           <a:p>
             <a:fld id="{46E06AA9-D0AD-45A1-A7DA-EE120CAAFDBD}" type="datetimeFigureOut">
               <a:rPr lang="en-GB" smtClean="0"/>
-              <a:t>18/03/2019</a:t>
+              <a:t>21/03/2019</a:t>
             </a:fld>
             <a:endParaRPr lang="en-GB"/>
           </a:p>
@@ -1186,7 +1186,7 @@
           <a:p>
             <a:fld id="{46E06AA9-D0AD-45A1-A7DA-EE120CAAFDBD}" type="datetimeFigureOut">
               <a:rPr lang="en-GB" smtClean="0"/>
-              <a:t>18/03/2019</a:t>
+              <a:t>21/03/2019</a:t>
             </a:fld>
             <a:endParaRPr lang="en-GB"/>
           </a:p>
@@ -1386,7 +1386,7 @@
           <a:p>
             <a:fld id="{46E06AA9-D0AD-45A1-A7DA-EE120CAAFDBD}" type="datetimeFigureOut">
               <a:rPr lang="en-GB" smtClean="0"/>
-              <a:t>18/03/2019</a:t>
+              <a:t>21/03/2019</a:t>
             </a:fld>
             <a:endParaRPr lang="en-GB"/>
           </a:p>
@@ -1662,7 +1662,7 @@
           <a:p>
             <a:fld id="{46E06AA9-D0AD-45A1-A7DA-EE120CAAFDBD}" type="datetimeFigureOut">
               <a:rPr lang="en-GB" smtClean="0"/>
-              <a:t>18/03/2019</a:t>
+              <a:t>21/03/2019</a:t>
             </a:fld>
             <a:endParaRPr lang="en-GB"/>
           </a:p>
@@ -1930,7 +1930,7 @@
           <a:p>
             <a:fld id="{46E06AA9-D0AD-45A1-A7DA-EE120CAAFDBD}" type="datetimeFigureOut">
               <a:rPr lang="en-GB" smtClean="0"/>
-              <a:t>18/03/2019</a:t>
+              <a:t>21/03/2019</a:t>
             </a:fld>
             <a:endParaRPr lang="en-GB"/>
           </a:p>
@@ -2345,7 +2345,7 @@
           <a:p>
             <a:fld id="{46E06AA9-D0AD-45A1-A7DA-EE120CAAFDBD}" type="datetimeFigureOut">
               <a:rPr lang="en-GB" smtClean="0"/>
-              <a:t>18/03/2019</a:t>
+              <a:t>21/03/2019</a:t>
             </a:fld>
             <a:endParaRPr lang="en-GB"/>
           </a:p>
@@ -2487,7 +2487,7 @@
           <a:p>
             <a:fld id="{46E06AA9-D0AD-45A1-A7DA-EE120CAAFDBD}" type="datetimeFigureOut">
               <a:rPr lang="en-GB" smtClean="0"/>
-              <a:t>18/03/2019</a:t>
+              <a:t>21/03/2019</a:t>
             </a:fld>
             <a:endParaRPr lang="en-GB"/>
           </a:p>
@@ -2600,7 +2600,7 @@
           <a:p>
             <a:fld id="{46E06AA9-D0AD-45A1-A7DA-EE120CAAFDBD}" type="datetimeFigureOut">
               <a:rPr lang="en-GB" smtClean="0"/>
-              <a:t>18/03/2019</a:t>
+              <a:t>21/03/2019</a:t>
             </a:fld>
             <a:endParaRPr lang="en-GB"/>
           </a:p>
@@ -2913,7 +2913,7 @@
           <a:p>
             <a:fld id="{46E06AA9-D0AD-45A1-A7DA-EE120CAAFDBD}" type="datetimeFigureOut">
               <a:rPr lang="en-GB" smtClean="0"/>
-              <a:t>18/03/2019</a:t>
+              <a:t>21/03/2019</a:t>
             </a:fld>
             <a:endParaRPr lang="en-GB"/>
           </a:p>
@@ -3202,7 +3202,7 @@
           <a:p>
             <a:fld id="{46E06AA9-D0AD-45A1-A7DA-EE120CAAFDBD}" type="datetimeFigureOut">
               <a:rPr lang="en-GB" smtClean="0"/>
-              <a:t>18/03/2019</a:t>
+              <a:t>21/03/2019</a:t>
             </a:fld>
             <a:endParaRPr lang="en-GB"/>
           </a:p>
@@ -3445,7 +3445,7 @@
           <a:p>
             <a:fld id="{46E06AA9-D0AD-45A1-A7DA-EE120CAAFDBD}" type="datetimeFigureOut">
               <a:rPr lang="en-GB" smtClean="0"/>
-              <a:t>18/03/2019</a:t>
+              <a:t>21/03/2019</a:t>
             </a:fld>
             <a:endParaRPr lang="en-GB"/>
           </a:p>
@@ -6506,7 +6506,7 @@
                 <a:latin typeface="Catamaran" panose="00000500000000000000" pitchFamily="2" charset="0"/>
                 <a:cs typeface="Catamaran" panose="00000500000000000000" pitchFamily="2" charset="0"/>
               </a:rPr>
-              <a:t>Services with single vendor provider</a:t>
+              <a:t>Microsoft Azure: $36bn</a:t>
             </a:r>
           </a:p>
           <a:p>
@@ -6521,7 +6521,7 @@
                 <a:latin typeface="Catamaran" panose="00000500000000000000" pitchFamily="2" charset="0"/>
                 <a:cs typeface="Catamaran" panose="00000500000000000000" pitchFamily="2" charset="0"/>
               </a:rPr>
-              <a:t>Improved speed to market</a:t>
+              <a:t>Amazon Web Services: $29.72bn</a:t>
             </a:r>
           </a:p>
           <a:p>
@@ -6536,7 +6536,7 @@
                 <a:latin typeface="Catamaran" panose="00000500000000000000" pitchFamily="2" charset="0"/>
                 <a:cs typeface="Catamaran" panose="00000500000000000000" pitchFamily="2" charset="0"/>
               </a:rPr>
-              <a:t>Careful application design</a:t>
+              <a:t>Oracle: $26.4bn</a:t>
             </a:r>
           </a:p>
           <a:p>
@@ -6551,7 +6551,7 @@
                 <a:latin typeface="Catamaran" panose="00000500000000000000" pitchFamily="2" charset="0"/>
                 <a:cs typeface="Catamaran" panose="00000500000000000000" pitchFamily="2" charset="0"/>
               </a:rPr>
-              <a:t>Switching costs</a:t>
+              <a:t>IBM: $12.2bn</a:t>
             </a:r>
           </a:p>
           <a:p>
@@ -6566,7 +6566,22 @@
                 <a:latin typeface="Catamaran" panose="00000500000000000000" pitchFamily="2" charset="0"/>
                 <a:cs typeface="Catamaran" panose="00000500000000000000" pitchFamily="2" charset="0"/>
               </a:rPr>
-              <a:t>Specific features</a:t>
+              <a:t>Google Cloud Platform: $4bn</a:t>
+            </a:r>
+          </a:p>
+          <a:p>
+            <a:pPr marL="0" indent="0">
+              <a:buNone/>
+            </a:pPr>
+            <a:r>
+              <a:rPr lang="en-GB" dirty="0">
+                <a:solidFill>
+                  <a:schemeClr val="bg1"/>
+                </a:solidFill>
+                <a:latin typeface="Catamaran" panose="00000500000000000000" pitchFamily="2" charset="0"/>
+                <a:cs typeface="Catamaran" panose="00000500000000000000" pitchFamily="2" charset="0"/>
+              </a:rPr>
+              <a:t>Alibaba: $3.85bn</a:t>
             </a:r>
           </a:p>
         </p:txBody>
@@ -6627,8 +6642,8 @@
         </p:nvSpPr>
         <p:spPr>
           <a:xfrm>
-            <a:off x="192032" y="1597576"/>
-            <a:ext cx="3986776" cy="2797686"/>
+            <a:off x="192032" y="1597575"/>
+            <a:ext cx="3986776" cy="4165049"/>
           </a:xfrm>
         </p:spPr>
         <p:txBody>
@@ -6645,7 +6660,7 @@
                 </a:solidFill>
                 <a:latin typeface="Helvetica LT Pro ExtraComp" panose="020B0508030502060204" pitchFamily="34" charset="0"/>
               </a:rPr>
-              <a:t>VENDOR</a:t>
+              <a:t>MULTI</a:t>
             </a:r>
             <a:br>
               <a:rPr lang="en-GB" sz="8000" dirty="0">
@@ -6662,7 +6677,24 @@
                 </a:solidFill>
                 <a:latin typeface="Helvetica LT Pro ExtraComp" panose="020B0508030502060204" pitchFamily="34" charset="0"/>
               </a:rPr>
-              <a:t>LOCK-IN</a:t>
+              <a:t>VENDOR</a:t>
+            </a:r>
+            <a:br>
+              <a:rPr lang="en-GB" sz="8000" dirty="0">
+                <a:solidFill>
+                  <a:schemeClr val="bg1"/>
+                </a:solidFill>
+                <a:latin typeface="Helvetica LT Pro ExtraComp" panose="020B0508030502060204" pitchFamily="34" charset="0"/>
+              </a:rPr>
+            </a:br>
+            <a:r>
+              <a:rPr lang="en-GB" sz="8000" dirty="0">
+                <a:solidFill>
+                  <a:schemeClr val="bg1"/>
+                </a:solidFill>
+                <a:latin typeface="Helvetica LT Pro ExtraComp" panose="020B0508030502060204" pitchFamily="34" charset="0"/>
+              </a:rPr>
+              <a:t>CLOUD</a:t>
             </a:r>
           </a:p>
         </p:txBody>
@@ -6670,7 +6702,7 @@
     </p:spTree>
     <p:extLst>
       <p:ext uri="{BB962C8B-B14F-4D97-AF65-F5344CB8AC3E}">
-        <p14:creationId xmlns:p14="http://schemas.microsoft.com/office/powerpoint/2010/main" val="510348695"/>
+        <p14:creationId xmlns:p14="http://schemas.microsoft.com/office/powerpoint/2010/main" val="2369187656"/>
       </p:ext>
     </p:extLst>
   </p:cSld>
@@ -6729,8 +6761,8 @@
         </p:nvSpPr>
         <p:spPr>
           <a:xfrm>
-            <a:off x="5181600" y="1610138"/>
-            <a:ext cx="6172200" cy="3597965"/>
+            <a:off x="5181600" y="1367873"/>
+            <a:ext cx="6172200" cy="4122253"/>
           </a:xfrm>
         </p:spPr>
         <p:txBody>
@@ -6750,7 +6782,7 @@
                 <a:latin typeface="Catamaran" panose="00000500000000000000" pitchFamily="2" charset="0"/>
                 <a:cs typeface="Catamaran" panose="00000500000000000000" pitchFamily="2" charset="0"/>
               </a:rPr>
-              <a:t>Microsoft Azure: $36bn</a:t>
+              <a:t>Microsoft Azure Stack</a:t>
             </a:r>
           </a:p>
           <a:p>
@@ -6765,7 +6797,7 @@
                 <a:latin typeface="Catamaran" panose="00000500000000000000" pitchFamily="2" charset="0"/>
                 <a:cs typeface="Catamaran" panose="00000500000000000000" pitchFamily="2" charset="0"/>
               </a:rPr>
-              <a:t>Amazon Web Services: $29.72bn</a:t>
+              <a:t>ExpressRoute / VPN</a:t>
             </a:r>
           </a:p>
           <a:p>
@@ -6780,7 +6812,7 @@
                 <a:latin typeface="Catamaran" panose="00000500000000000000" pitchFamily="2" charset="0"/>
                 <a:cs typeface="Catamaran" panose="00000500000000000000" pitchFamily="2" charset="0"/>
               </a:rPr>
-              <a:t>Oracle: $26.4bn</a:t>
+              <a:t>Azure Active Directory</a:t>
             </a:r>
           </a:p>
           <a:p>
@@ -6795,7 +6827,7 @@
                 <a:latin typeface="Catamaran" panose="00000500000000000000" pitchFamily="2" charset="0"/>
                 <a:cs typeface="Catamaran" panose="00000500000000000000" pitchFamily="2" charset="0"/>
               </a:rPr>
-              <a:t>IBM: $12.2bn</a:t>
+              <a:t>Azure Batch</a:t>
             </a:r>
           </a:p>
           <a:p>
@@ -6810,7 +6842,7 @@
                 <a:latin typeface="Catamaran" panose="00000500000000000000" pitchFamily="2" charset="0"/>
                 <a:cs typeface="Catamaran" panose="00000500000000000000" pitchFamily="2" charset="0"/>
               </a:rPr>
-              <a:t>Google Cloud Platform: $4bn</a:t>
+              <a:t>Service Bus Relay</a:t>
             </a:r>
           </a:p>
           <a:p>
@@ -6825,7 +6857,22 @@
                 <a:latin typeface="Catamaran" panose="00000500000000000000" pitchFamily="2" charset="0"/>
                 <a:cs typeface="Catamaran" panose="00000500000000000000" pitchFamily="2" charset="0"/>
               </a:rPr>
-              <a:t>Alibaba: $3.85bn</a:t>
+              <a:t>Azure Data Factory</a:t>
+            </a:r>
+          </a:p>
+          <a:p>
+            <a:pPr marL="0" indent="0">
+              <a:buNone/>
+            </a:pPr>
+            <a:r>
+              <a:rPr lang="en-GB" dirty="0">
+                <a:solidFill>
+                  <a:schemeClr val="bg1"/>
+                </a:solidFill>
+                <a:latin typeface="Catamaran" panose="00000500000000000000" pitchFamily="2" charset="0"/>
+                <a:cs typeface="Catamaran" panose="00000500000000000000" pitchFamily="2" charset="0"/>
+              </a:rPr>
+              <a:t>SQL Server Stretch Database</a:t>
             </a:r>
           </a:p>
         </p:txBody>
@@ -6904,24 +6951,7 @@
                 </a:solidFill>
                 <a:latin typeface="Helvetica LT Pro ExtraComp" panose="020B0508030502060204" pitchFamily="34" charset="0"/>
               </a:rPr>
-              <a:t>MULTI</a:t>
-            </a:r>
-            <a:br>
-              <a:rPr lang="en-GB" sz="8000" dirty="0">
-                <a:solidFill>
-                  <a:schemeClr val="bg1"/>
-                </a:solidFill>
-                <a:latin typeface="Helvetica LT Pro ExtraComp" panose="020B0508030502060204" pitchFamily="34" charset="0"/>
-              </a:rPr>
-            </a:br>
-            <a:r>
-              <a:rPr lang="en-GB" sz="8000" dirty="0">
-                <a:solidFill>
-                  <a:schemeClr val="bg1"/>
-                </a:solidFill>
-                <a:latin typeface="Helvetica LT Pro ExtraComp" panose="020B0508030502060204" pitchFamily="34" charset="0"/>
-              </a:rPr>
-              <a:t>VENDOR</a:t>
+              <a:t>HYBRID</a:t>
             </a:r>
             <a:br>
               <a:rPr lang="en-GB" sz="8000" dirty="0">
@@ -6946,7 +6976,7 @@
     </p:spTree>
     <p:extLst>
       <p:ext uri="{BB962C8B-B14F-4D97-AF65-F5344CB8AC3E}">
-        <p14:creationId xmlns:p14="http://schemas.microsoft.com/office/powerpoint/2010/main" val="2369187656"/>
+        <p14:creationId xmlns:p14="http://schemas.microsoft.com/office/powerpoint/2010/main" val="3705669233"/>
       </p:ext>
     </p:extLst>
   </p:cSld>
@@ -7005,8 +7035,8 @@
         </p:nvSpPr>
         <p:spPr>
           <a:xfrm>
-            <a:off x="5181600" y="1367873"/>
-            <a:ext cx="6172200" cy="4122253"/>
+            <a:off x="5181600" y="1610138"/>
+            <a:ext cx="6172200" cy="3597965"/>
           </a:xfrm>
         </p:spPr>
         <p:txBody>
@@ -7026,7 +7056,7 @@
                 <a:latin typeface="Catamaran" panose="00000500000000000000" pitchFamily="2" charset="0"/>
                 <a:cs typeface="Catamaran" panose="00000500000000000000" pitchFamily="2" charset="0"/>
               </a:rPr>
-              <a:t>Microsoft Azure Stack</a:t>
+              <a:t>Services with single vendor provider</a:t>
             </a:r>
           </a:p>
           <a:p>
@@ -7041,7 +7071,7 @@
                 <a:latin typeface="Catamaran" panose="00000500000000000000" pitchFamily="2" charset="0"/>
                 <a:cs typeface="Catamaran" panose="00000500000000000000" pitchFamily="2" charset="0"/>
               </a:rPr>
-              <a:t>ExpressRoute / VPN</a:t>
+              <a:t>Improved speed to market</a:t>
             </a:r>
           </a:p>
           <a:p>
@@ -7056,7 +7086,7 @@
                 <a:latin typeface="Catamaran" panose="00000500000000000000" pitchFamily="2" charset="0"/>
                 <a:cs typeface="Catamaran" panose="00000500000000000000" pitchFamily="2" charset="0"/>
               </a:rPr>
-              <a:t>Azure Active Directory</a:t>
+              <a:t>Careful application design</a:t>
             </a:r>
           </a:p>
           <a:p>
@@ -7071,7 +7101,7 @@
                 <a:latin typeface="Catamaran" panose="00000500000000000000" pitchFamily="2" charset="0"/>
                 <a:cs typeface="Catamaran" panose="00000500000000000000" pitchFamily="2" charset="0"/>
               </a:rPr>
-              <a:t>Azure Batch</a:t>
+              <a:t>Switching costs</a:t>
             </a:r>
           </a:p>
           <a:p>
@@ -7086,37 +7116,7 @@
                 <a:latin typeface="Catamaran" panose="00000500000000000000" pitchFamily="2" charset="0"/>
                 <a:cs typeface="Catamaran" panose="00000500000000000000" pitchFamily="2" charset="0"/>
               </a:rPr>
-              <a:t>Service Bus Relay</a:t>
-            </a:r>
-          </a:p>
-          <a:p>
-            <a:pPr marL="0" indent="0">
-              <a:buNone/>
-            </a:pPr>
-            <a:r>
-              <a:rPr lang="en-GB" dirty="0">
-                <a:solidFill>
-                  <a:schemeClr val="bg1"/>
-                </a:solidFill>
-                <a:latin typeface="Catamaran" panose="00000500000000000000" pitchFamily="2" charset="0"/>
-                <a:cs typeface="Catamaran" panose="00000500000000000000" pitchFamily="2" charset="0"/>
-              </a:rPr>
-              <a:t>Azure Data Factory</a:t>
-            </a:r>
-          </a:p>
-          <a:p>
-            <a:pPr marL="0" indent="0">
-              <a:buNone/>
-            </a:pPr>
-            <a:r>
-              <a:rPr lang="en-GB" dirty="0">
-                <a:solidFill>
-                  <a:schemeClr val="bg1"/>
-                </a:solidFill>
-                <a:latin typeface="Catamaran" panose="00000500000000000000" pitchFamily="2" charset="0"/>
-                <a:cs typeface="Catamaran" panose="00000500000000000000" pitchFamily="2" charset="0"/>
-              </a:rPr>
-              <a:t>SQL Server Stretch Database</a:t>
+              <a:t>Specific features</a:t>
             </a:r>
           </a:p>
         </p:txBody>
@@ -7177,8 +7177,8 @@
         </p:nvSpPr>
         <p:spPr>
           <a:xfrm>
-            <a:off x="192032" y="1597575"/>
-            <a:ext cx="3986776" cy="4165049"/>
+            <a:off x="192032" y="1597576"/>
+            <a:ext cx="3986776" cy="2797686"/>
           </a:xfrm>
         </p:spPr>
         <p:txBody>
@@ -7195,7 +7195,7 @@
                 </a:solidFill>
                 <a:latin typeface="Helvetica LT Pro ExtraComp" panose="020B0508030502060204" pitchFamily="34" charset="0"/>
               </a:rPr>
-              <a:t>HYBRID</a:t>
+              <a:t>VENDOR</a:t>
             </a:r>
             <a:br>
               <a:rPr lang="en-GB" sz="8000" dirty="0">
@@ -7212,7 +7212,7 @@
                 </a:solidFill>
                 <a:latin typeface="Helvetica LT Pro ExtraComp" panose="020B0508030502060204" pitchFamily="34" charset="0"/>
               </a:rPr>
-              <a:t>CLOUD</a:t>
+              <a:t>LOCK-IN</a:t>
             </a:r>
           </a:p>
         </p:txBody>
@@ -7220,7 +7220,7 @@
     </p:spTree>
     <p:extLst>
       <p:ext uri="{BB962C8B-B14F-4D97-AF65-F5344CB8AC3E}">
-        <p14:creationId xmlns:p14="http://schemas.microsoft.com/office/powerpoint/2010/main" val="3705669233"/>
+        <p14:creationId xmlns:p14="http://schemas.microsoft.com/office/powerpoint/2010/main" val="510348695"/>
       </p:ext>
     </p:extLst>
   </p:cSld>

</xml_diff>